<commit_message>
All updates qith quart rendering to pptx format.
</commit_message>
<xml_diff>
--- a/Dengue_report.pptx
+++ b/Dengue_report.pptx
@@ -21,6 +21,9 @@
     <p:sldId id="269" r:id="rId15"/>
     <p:sldId id="270" r:id="rId16"/>
     <p:sldId id="271" r:id="rId17"/>
+    <p:sldId id="272" r:id="rId18"/>
+    <p:sldId id="273" r:id="rId19"/>
+    <p:sldId id="274" r:id="rId20"/>
   </p:sldIdLst>
   <p:sldSz cx="9144000" cy="5143500" type="screen16x9"/>
   <p:notesSz cx="6858000" cy="9144000"/>
@@ -3162,7 +3165,7 @@
             <a:br/>
             <a:r>
               <a:rPr/>
-              <a:t>Brian</a:t>
+              <a:t>Brian Brummer, Mariken de Wit, Manar Alkuzweny, and Robert Reiner</a:t>
             </a:r>
           </a:p>
         </p:txBody>
@@ -4357,7 +4360,7 @@
             </a:pPr>
             <a:r>
               <a:rPr/>
-              <a:t>Figure 2: DIagram of the proportion of estimated to Colombo with varying Force of infection. We assume Colombo has a lambda of 0.037 ( derived from Primary infection incidence) and that Gampaha has 77% of the cases in Colombo. We also assume that cases are secondary infections.</a:t>
+              <a:t>Figure 3: DIagram of the proportion of estimated to Colombo with varying Force of infection. We assume Colombo has a lambda of 0.037 ( derived from Primary infection incidence) and that Gampaha has 77% of the cases in Colombo. We also assume that cases are secondary infections.</a:t>
             </a:r>
           </a:p>
         </p:txBody>
@@ -4467,7 +4470,7 @@
             </a:pPr>
             <a:r>
               <a:rPr/>
-              <a:t>Figure 3: Output</a:t>
+              <a:t>Figure 4: Output</a:t>
             </a:r>
           </a:p>
         </p:txBody>
@@ -4478,6 +4481,170 @@
 </file>
 
 <file path=ppt/slides/slide15.xml><?xml version="1.0" encoding="utf-8"?>
+<p:sld xmlns:a="http://schemas.openxmlformats.org/drawingml/2006/main" xmlns:r="http://schemas.openxmlformats.org/officeDocument/2006/relationships" xmlns:p="http://schemas.openxmlformats.org/presentationml/2006/main">
+  <p:cSld>
+    <p:spTree>
+      <p:nvGrpSpPr>
+        <p:cNvPr id="1" name=""/>
+        <p:cNvGrpSpPr/>
+        <p:nvPr/>
+      </p:nvGrpSpPr>
+      <p:grpSpPr>
+        <a:xfrm>
+          <a:off x="0" y="0"/>
+          <a:ext cx="0" cy="0"/>
+          <a:chOff x="0" y="0"/>
+          <a:chExt cx="0" cy="0"/>
+        </a:xfrm>
+      </p:grpSpPr>
+      <p:pic>
+        <p:nvPicPr>
+          <p:cNvPr descr="Dengue_report_files/figure-pptx/fig-sampsi-1.png" id="0" name="Picture 1"/>
+          <p:cNvPicPr>
+            <a:picLocks noGrp="1" noChangeAspect="1"/>
+          </p:cNvPicPr>
+          <p:nvPr/>
+        </p:nvPicPr>
+        <p:blipFill>
+          <a:blip r:embed="rId2"/>
+          <a:stretch>
+            <a:fillRect/>
+          </a:stretch>
+        </p:blipFill>
+        <p:spPr bwMode="auto">
+          <a:xfrm>
+            <a:off x="1689100" y="1193800"/>
+            <a:ext cx="5765800" cy="2882900"/>
+          </a:xfrm>
+          <a:prstGeom prst="rect">
+            <a:avLst/>
+          </a:prstGeom>
+          <a:noFill/>
+          <a:ln w="9525">
+            <a:noFill/>
+            <a:headEnd/>
+            <a:tailEnd/>
+          </a:ln>
+        </p:spPr>
+      </p:pic>
+      <p:sp>
+        <p:nvSpPr>
+          <p:cNvPr id="1" name="TextBox 3"/>
+          <p:cNvSpPr txBox="1"/>
+          <p:nvPr/>
+        </p:nvSpPr>
+        <p:spPr>
+          <a:xfrm>
+            <a:off x="457200" y="4076700"/>
+            <a:ext cx="8229600" cy="508000"/>
+          </a:xfrm>
+          <a:prstGeom prst="rect">
+            <a:avLst/>
+          </a:prstGeom>
+          <a:noFill/>
+        </p:spPr>
+        <p:txBody>
+          <a:bodyPr/>
+          <a:lstStyle/>
+          <a:p>
+            <a:pPr lvl="0" indent="0" marL="0" algn="ctr">
+              <a:buNone/>
+            </a:pPr>
+            <a:r>
+              <a:rPr/>
+              <a:t>Figure 5: The sample sizes needed to show  pi sample size for k clusters and n participants.</a:t>
+            </a:r>
+          </a:p>
+        </p:txBody>
+      </p:sp>
+    </p:spTree>
+  </p:cSld>
+</p:sld>
+</file>
+
+<file path=ppt/slides/slide16.xml><?xml version="1.0" encoding="utf-8"?>
+<p:sld xmlns:a="http://schemas.openxmlformats.org/drawingml/2006/main" xmlns:r="http://schemas.openxmlformats.org/officeDocument/2006/relationships" xmlns:p="http://schemas.openxmlformats.org/presentationml/2006/main">
+  <p:cSld>
+    <p:spTree>
+      <p:nvGrpSpPr>
+        <p:cNvPr id="1" name=""/>
+        <p:cNvGrpSpPr/>
+        <p:nvPr/>
+      </p:nvGrpSpPr>
+      <p:grpSpPr>
+        <a:xfrm>
+          <a:off x="0" y="0"/>
+          <a:ext cx="0" cy="0"/>
+          <a:chOff x="0" y="0"/>
+          <a:chExt cx="0" cy="0"/>
+        </a:xfrm>
+      </p:grpSpPr>
+      <p:pic>
+        <p:nvPicPr>
+          <p:cNvPr descr="Dengue_report_files/figure-pptx/fig-sampsiinfection-1.png" id="0" name="Picture 1"/>
+          <p:cNvPicPr>
+            <a:picLocks noGrp="1" noChangeAspect="1"/>
+          </p:cNvPicPr>
+          <p:nvPr/>
+        </p:nvPicPr>
+        <p:blipFill>
+          <a:blip r:embed="rId2"/>
+          <a:stretch>
+            <a:fillRect/>
+          </a:stretch>
+        </p:blipFill>
+        <p:spPr bwMode="auto">
+          <a:xfrm>
+            <a:off x="1689100" y="1193800"/>
+            <a:ext cx="5765800" cy="2882900"/>
+          </a:xfrm>
+          <a:prstGeom prst="rect">
+            <a:avLst/>
+          </a:prstGeom>
+          <a:noFill/>
+          <a:ln w="9525">
+            <a:noFill/>
+            <a:headEnd/>
+            <a:tailEnd/>
+          </a:ln>
+        </p:spPr>
+      </p:pic>
+      <p:sp>
+        <p:nvSpPr>
+          <p:cNvPr id="1" name="TextBox 3"/>
+          <p:cNvSpPr txBox="1"/>
+          <p:nvPr/>
+        </p:nvSpPr>
+        <p:spPr>
+          <a:xfrm>
+            <a:off x="457200" y="4076700"/>
+            <a:ext cx="8229600" cy="508000"/>
+          </a:xfrm>
+          <a:prstGeom prst="rect">
+            <a:avLst/>
+          </a:prstGeom>
+          <a:noFill/>
+        </p:spPr>
+        <p:txBody>
+          <a:bodyPr/>
+          <a:lstStyle/>
+          <a:p>
+            <a:pPr lvl="0" indent="0" marL="0" algn="ctr">
+              <a:buNone/>
+            </a:pPr>
+            <a:r>
+              <a:rPr/>
+              <a:t>Figure 6: The Sample sizes needed to show  pi sample size for k clusters and n participants.</a:t>
+            </a:r>
+          </a:p>
+        </p:txBody>
+      </p:sp>
+    </p:spTree>
+  </p:cSld>
+</p:sld>
+</file>
+
+<file path=ppt/slides/slide17.xml><?xml version="1.0" encoding="utf-8"?>
 <p:sld xmlns:a="http://schemas.openxmlformats.org/drawingml/2006/main" xmlns:r="http://schemas.openxmlformats.org/officeDocument/2006/relationships" xmlns:p="http://schemas.openxmlformats.org/presentationml/2006/main">
   <p:cSld>
     <p:spTree>
@@ -4568,7 +4735,7 @@
 </p:sld>
 </file>
 
-<file path=ppt/slides/slide16.xml><?xml version="1.0" encoding="utf-8"?>
+<file path=ppt/slides/slide18.xml><?xml version="1.0" encoding="utf-8"?>
 <p:sld xmlns:a="http://schemas.openxmlformats.org/drawingml/2006/main" xmlns:r="http://schemas.openxmlformats.org/officeDocument/2006/relationships" xmlns:p="http://schemas.openxmlformats.org/presentationml/2006/main">
   <p:cSld>
     <p:spTree>
@@ -4610,6 +4777,53 @@
           </a:p>
         </p:txBody>
       </p:sp>
+    </p:spTree>
+  </p:cSld>
+</p:sld>
+</file>
+
+<file path=ppt/slides/slide19.xml><?xml version="1.0" encoding="utf-8"?>
+<p:sld xmlns:a="http://schemas.openxmlformats.org/drawingml/2006/main" xmlns:r="http://schemas.openxmlformats.org/officeDocument/2006/relationships" xmlns:p="http://schemas.openxmlformats.org/presentationml/2006/main">
+  <p:cSld>
+    <p:spTree>
+      <p:nvGrpSpPr>
+        <p:cNvPr id="1" name=""/>
+        <p:cNvGrpSpPr/>
+        <p:nvPr/>
+      </p:nvGrpSpPr>
+      <p:grpSpPr>
+        <a:xfrm>
+          <a:off x="0" y="0"/>
+          <a:ext cx="0" cy="0"/>
+          <a:chOff x="0" y="0"/>
+          <a:chExt cx="0" cy="0"/>
+        </a:xfrm>
+      </p:grpSpPr>
+      <p:sp>
+        <p:nvSpPr>
+          <p:cNvPr id="2" name="Title 1"/>
+          <p:cNvSpPr>
+            <a:spLocks noGrp="1"/>
+          </p:cNvSpPr>
+          <p:nvPr>
+            <p:ph type="title"/>
+          </p:nvPr>
+        </p:nvSpPr>
+        <p:spPr/>
+        <p:txBody>
+          <a:bodyPr/>
+          <a:lstStyle/>
+          <a:p>
+            <a:pPr lvl="0" indent="0" marL="0">
+              <a:buNone/>
+            </a:pPr>
+            <a:r>
+              <a:rPr/>
+              <a:t>References</a:t>
+            </a:r>
+          </a:p>
+        </p:txBody>
+      </p:sp>
       <p:sp>
         <p:nvSpPr>
           <p:cNvPr id="3" name="Content Placeholder 2"/>
@@ -4630,13 +4844,98 @@
             </a:pPr>
             <a:r>
               <a:rPr/>
-              <a:t>[1] C.C. Tam, H. Tissera, A.M. de Silva, A.D. De Silva, H.S. Margolis, A. Amarasinge, Estimates of Dengue Force of Infection in Children in Colombo, Sri Lanka, PLoS Negl Trop Dis. 7 (2013) e2259. https://doi.org/</a:t>
+              <a:t>[1] W.H. Organization, Dengue and severe dengue, World Health Organizatin (WHO), 2023.</a:t>
+            </a:r>
+          </a:p>
+          <a:p>
+            <a:pPr lvl="0" indent="0" marL="0">
+              <a:buNone/>
+            </a:pPr>
+            <a:r>
+              <a:rPr/>
+              <a:t>[2] S.A. Kularatne, C. Dalugama, Dengue infection: Global importance, immunopathology and management, Clin Med. 22 (2022) 9–13. https://doi.org/</a:t>
             </a:r>
             <a:r>
               <a:rPr>
                 <a:hlinkClick r:id="rId2"/>
               </a:rPr>
+              <a:t>10.7861/clinmed.2021-0791</a:t>
+            </a:r>
+            <a:r>
+              <a:rPr/>
+              <a:t>.</a:t>
+            </a:r>
+          </a:p>
+          <a:p>
+            <a:pPr lvl="0" indent="0" marL="0">
+              <a:buNone/>
+            </a:pPr>
+            <a:r>
+              <a:rPr/>
+              <a:t>[3] S. Bhatt, P.W. Gething, O.J. Brady, J.P. Messina, A.W. Farlow, C.L. Moyes, J.M. Drake, J.S. Brownstein, A.G. Hoen, O. Sankoh, M.F. Myers, D.B. George, T. Jaenisch, G.R.W. Wint, C.P. Simmons, T.W. Scott, J.J. Farrar, S.I. Hay, The global distribution and burden of dengue, Nature. 496 (2013) 504–507. https://doi.org/</a:t>
+            </a:r>
+            <a:r>
+              <a:rPr>
+                <a:hlinkClick r:id="rId3"/>
+              </a:rPr>
+              <a:t>10.1038/nature12060</a:t>
+            </a:r>
+            <a:r>
+              <a:rPr/>
+              <a:t>.</a:t>
+            </a:r>
+          </a:p>
+          <a:p>
+            <a:pPr lvl="0" indent="0" marL="0">
+              <a:buNone/>
+            </a:pPr>
+            <a:r>
+              <a:rPr/>
+              <a:t>[4] C.C. Tam, H. Tissera, A.M. de Silva, A.D. De Silva, H.S. Margolis, A. Amarasinge, Estimates of Dengue Force of Infection in Children in Colombo, Sri Lanka, PLoS Negl Trop Dis. 7 (2013) e2259. https://doi.org/</a:t>
+            </a:r>
+            <a:r>
+              <a:rPr>
+                <a:hlinkClick r:id="rId4"/>
+              </a:rPr>
               <a:t>10.1371/journal.pntd.0002259</a:t>
+            </a:r>
+            <a:r>
+              <a:rPr/>
+              <a:t>.</a:t>
+            </a:r>
+          </a:p>
+          <a:p>
+            <a:pPr lvl="0" indent="0" marL="0">
+              <a:buNone/>
+            </a:pPr>
+            <a:r>
+              <a:rPr/>
+              <a:t>[5] N.L. Achee, F. Gould, T.A. Perkins, R.C. Reiner, A.C. Morrison, S.A. Ritchie, D.J. Gubler, R. Teyssou, T.W. Scott, A Critical Assessment of Vector Control for Dengue Prevention, PLoS Negl Trop Dis. 9 (2015) e0003655. https://doi.org/</a:t>
+            </a:r>
+            <a:r>
+              <a:rPr>
+                <a:hlinkClick r:id="rId5"/>
+              </a:rPr>
+              <a:t>10.1371/journal.pntd.0003655</a:t>
+            </a:r>
+            <a:r>
+              <a:rPr/>
+              <a:t>.</a:t>
+            </a:r>
+          </a:p>
+          <a:p>
+            <a:pPr lvl="0" indent="0" marL="0">
+              <a:buNone/>
+            </a:pPr>
+            <a:r>
+              <a:rPr/>
+              <a:t>[6] N. Kanakaratne, W.M.P.B. Wahala, W.B. Messer, H.A. Tissera, A. Shahani, N. Abeysinghe, A.M. de Silva, M. Gunasekera, Severe Dengue Epidemics in Sri Lanka, 2003–2006, Emerg. Infect. Dis. 15 (2009) 192–199. https://doi.org/</a:t>
+            </a:r>
+            <a:r>
+              <a:rPr>
+                <a:hlinkClick r:id="rId6"/>
+              </a:rPr>
+              <a:t>10.3201/eid1502.080926</a:t>
             </a:r>
             <a:r>
               <a:rPr/>
@@ -4844,6 +5143,15 @@
               <a:t>Next Steps</a:t>
             </a:r>
           </a:p>
+          <a:p>
+            <a:pPr lvl="0"/>
+            <a:r>
+              <a:rPr>
+                <a:hlinkClick r:id="rId17" action="ppaction://hlinksldjump"/>
+              </a:rPr>
+              <a:t>References</a:t>
+            </a:r>
+          </a:p>
         </p:txBody>
       </p:sp>
     </p:spTree>
@@ -4878,7 +5186,12 @@
             <p:ph type="title"/>
           </p:nvPr>
         </p:nvSpPr>
-        <p:spPr/>
+        <p:spPr>
+          <a:xfrm>
+            <a:off x="457201" y="204787"/>
+            <a:ext cx="3008313" cy="871538"/>
+          </a:xfrm>
+        </p:spPr>
         <p:txBody>
           <a:bodyPr/>
           <a:lstStyle/>
@@ -4895,12 +5208,12 @@
       </p:sp>
       <p:sp>
         <p:nvSpPr>
-          <p:cNvPr id="3" name="Content Placeholder 2"/>
-          <p:cNvSpPr>
-            <a:spLocks noGrp="1"/>
-          </p:cNvSpPr>
-          <p:nvPr>
-            <p:ph idx="1"/>
+          <p:cNvPr id="4" name="Text Placeholder 3"/>
+          <p:cNvSpPr>
+            <a:spLocks noGrp="1"/>
+          </p:cNvSpPr>
+          <p:nvPr>
+            <p:ph idx="2" sz="half" type="body"/>
           </p:nvPr>
         </p:nvSpPr>
         <p:spPr/>
@@ -4913,7 +5226,76 @@
             </a:pPr>
             <a:r>
               <a:rPr/>
-              <a:t>Dengue Fever is bits and bob. Its incidence is x. We use a catalytic modelling to inform study design.</a:t>
+              <a:t>Dengue causes 400 million infections worldwide every year, leading to 100 million becoming ill and 21,000 deaths (making it the most impactful arboviral disease in humans). Case incidence is increasing exponentially, from 0.5 million cases in 2000 to 5 million in 2019.[1–3]</a:t>
+            </a:r>
+          </a:p>
+          <a:p>
+            <a:pPr lvl="0" indent="0" marL="0">
+              <a:buNone/>
+            </a:pPr>
+            <a:r>
+              <a:rPr/>
+              <a:t>Four serotypes Second infection most severe Since early 2000s dengue outbreaks in Sri Lanka have become larger and multiple serotypes are now circulating [4] Vector control is main focus of prevention efforts [5,6].</a:t>
+            </a:r>
+          </a:p>
+        </p:txBody>
+      </p:sp>
+      <p:pic>
+        <p:nvPicPr>
+          <p:cNvPr descr="map_bhatt.png" id="0" name="Picture 1"/>
+          <p:cNvPicPr>
+            <a:picLocks noGrp="1" noChangeAspect="1"/>
+          </p:cNvPicPr>
+          <p:nvPr/>
+        </p:nvPicPr>
+        <p:blipFill>
+          <a:blip r:embed="rId2"/>
+          <a:stretch>
+            <a:fillRect/>
+          </a:stretch>
+        </p:blipFill>
+        <p:spPr bwMode="auto">
+          <a:xfrm>
+            <a:off x="3568700" y="825500"/>
+            <a:ext cx="5105400" cy="2616200"/>
+          </a:xfrm>
+          <a:prstGeom prst="rect">
+            <a:avLst/>
+          </a:prstGeom>
+          <a:noFill/>
+          <a:ln w="9525">
+            <a:noFill/>
+            <a:headEnd/>
+            <a:tailEnd/>
+          </a:ln>
+        </p:spPr>
+      </p:pic>
+      <p:sp>
+        <p:nvSpPr>
+          <p:cNvPr id="1" name="TextBox 3"/>
+          <p:cNvSpPr txBox="1"/>
+          <p:nvPr/>
+        </p:nvSpPr>
+        <p:spPr>
+          <a:xfrm>
+            <a:off x="3568700" y="4076700"/>
+            <a:ext cx="5105400" cy="508000"/>
+          </a:xfrm>
+          <a:prstGeom prst="rect">
+            <a:avLst/>
+          </a:prstGeom>
+          <a:noFill/>
+        </p:spPr>
+        <p:txBody>
+          <a:bodyPr/>
+          <a:lstStyle/>
+          <a:p>
+            <a:pPr lvl="0" indent="0" marL="0" algn="ctr">
+              <a:buNone/>
+            </a:pPr>
+            <a:r>
+              <a:rPr/>
+              <a:t>Figure 1: Taken from Bhatt, et al. (2013) [3] , Shows ‘a cartogram of the annual number of infections for all ages as a proportion of national or sub-national (China) geographical area.’</a:t>
             </a:r>
           </a:p>
         </p:txBody>
@@ -5068,7 +5450,7 @@
             </a:pPr>
             <a:r>
               <a:rPr/>
-              <a:t>Power Calculations</a:t>
+              <a:t>Calculate the number of participants needed in a cluster randomised trial.</a:t>
             </a:r>
           </a:p>
         </p:txBody>
@@ -5175,7 +5557,7 @@
             </a:pPr>
             <a:r>
               <a:rPr/>
-              <a:t>Figure 1: SLADE model diagram. Note: Time steps nor all compartments are displayed.</a:t>
+              <a:t>Figure 2: SLADE model diagram. Note: Time steps nor all compartments are displayed.</a:t>
             </a:r>
           </a:p>
         </p:txBody>
@@ -5234,7 +5616,7 @@
             </a:pPr>
             <a:r>
               <a:rPr/>
-              <a:t>We take the probability of first infection of ~ 14.1%.[1],</a:t>
+              <a:t>We take the probability of first infection of ~ 14.1%.[4],</a:t>
             </a:r>
           </a:p>
           <a:p>

</xml_diff>